<commit_message>
La inn eksempel på hvordan legge til scener til spillet
</commit_message>
<xml_diff>
--- a/UML/UML i powerpoint.pptx
+++ b/UML/UML i powerpoint.pptx
@@ -104,6 +104,11 @@
       </a:defRPr>
     </a:lvl9pPr>
   </p:defaultTextStyle>
+  <p:extLst>
+    <p:ext uri="{EFAFB233-063F-42B5-8137-9DF3F51BA10A}">
+      <p15:sldGuideLst xmlns:p15="http://schemas.microsoft.com/office/powerpoint/2012/main"/>
+    </p:ext>
+  </p:extLst>
 </p:presentation>
 </file>
 
@@ -238,7 +243,7 @@
           <a:p>
             <a:fld id="{F6395636-49B5-4E07-A879-AFC5F9730C91}" type="datetimeFigureOut">
               <a:rPr lang="nb-NO" smtClean="0"/>
-              <a:t>31.10.2023</a:t>
+              <a:t>03.11.2023</a:t>
             </a:fld>
             <a:endParaRPr lang="nb-NO"/>
           </a:p>
@@ -408,7 +413,7 @@
           <a:p>
             <a:fld id="{F6395636-49B5-4E07-A879-AFC5F9730C91}" type="datetimeFigureOut">
               <a:rPr lang="nb-NO" smtClean="0"/>
-              <a:t>31.10.2023</a:t>
+              <a:t>03.11.2023</a:t>
             </a:fld>
             <a:endParaRPr lang="nb-NO"/>
           </a:p>
@@ -588,7 +593,7 @@
           <a:p>
             <a:fld id="{F6395636-49B5-4E07-A879-AFC5F9730C91}" type="datetimeFigureOut">
               <a:rPr lang="nb-NO" smtClean="0"/>
-              <a:t>31.10.2023</a:t>
+              <a:t>03.11.2023</a:t>
             </a:fld>
             <a:endParaRPr lang="nb-NO"/>
           </a:p>
@@ -758,7 +763,7 @@
           <a:p>
             <a:fld id="{F6395636-49B5-4E07-A879-AFC5F9730C91}" type="datetimeFigureOut">
               <a:rPr lang="nb-NO" smtClean="0"/>
-              <a:t>31.10.2023</a:t>
+              <a:t>03.11.2023</a:t>
             </a:fld>
             <a:endParaRPr lang="nb-NO"/>
           </a:p>
@@ -1004,7 +1009,7 @@
           <a:p>
             <a:fld id="{F6395636-49B5-4E07-A879-AFC5F9730C91}" type="datetimeFigureOut">
               <a:rPr lang="nb-NO" smtClean="0"/>
-              <a:t>31.10.2023</a:t>
+              <a:t>03.11.2023</a:t>
             </a:fld>
             <a:endParaRPr lang="nb-NO"/>
           </a:p>
@@ -1236,7 +1241,7 @@
           <a:p>
             <a:fld id="{F6395636-49B5-4E07-A879-AFC5F9730C91}" type="datetimeFigureOut">
               <a:rPr lang="nb-NO" smtClean="0"/>
-              <a:t>31.10.2023</a:t>
+              <a:t>03.11.2023</a:t>
             </a:fld>
             <a:endParaRPr lang="nb-NO"/>
           </a:p>
@@ -1603,7 +1608,7 @@
           <a:p>
             <a:fld id="{F6395636-49B5-4E07-A879-AFC5F9730C91}" type="datetimeFigureOut">
               <a:rPr lang="nb-NO" smtClean="0"/>
-              <a:t>31.10.2023</a:t>
+              <a:t>03.11.2023</a:t>
             </a:fld>
             <a:endParaRPr lang="nb-NO"/>
           </a:p>
@@ -1721,7 +1726,7 @@
           <a:p>
             <a:fld id="{F6395636-49B5-4E07-A879-AFC5F9730C91}" type="datetimeFigureOut">
               <a:rPr lang="nb-NO" smtClean="0"/>
-              <a:t>31.10.2023</a:t>
+              <a:t>03.11.2023</a:t>
             </a:fld>
             <a:endParaRPr lang="nb-NO"/>
           </a:p>
@@ -1816,7 +1821,7 @@
           <a:p>
             <a:fld id="{F6395636-49B5-4E07-A879-AFC5F9730C91}" type="datetimeFigureOut">
               <a:rPr lang="nb-NO" smtClean="0"/>
-              <a:t>31.10.2023</a:t>
+              <a:t>03.11.2023</a:t>
             </a:fld>
             <a:endParaRPr lang="nb-NO"/>
           </a:p>
@@ -2093,7 +2098,7 @@
           <a:p>
             <a:fld id="{F6395636-49B5-4E07-A879-AFC5F9730C91}" type="datetimeFigureOut">
               <a:rPr lang="nb-NO" smtClean="0"/>
-              <a:t>31.10.2023</a:t>
+              <a:t>03.11.2023</a:t>
             </a:fld>
             <a:endParaRPr lang="nb-NO"/>
           </a:p>
@@ -2350,7 +2355,7 @@
           <a:p>
             <a:fld id="{F6395636-49B5-4E07-A879-AFC5F9730C91}" type="datetimeFigureOut">
               <a:rPr lang="nb-NO" smtClean="0"/>
-              <a:t>31.10.2023</a:t>
+              <a:t>03.11.2023</a:t>
             </a:fld>
             <a:endParaRPr lang="nb-NO"/>
           </a:p>
@@ -2563,7 +2568,7 @@
           <a:p>
             <a:fld id="{F6395636-49B5-4E07-A879-AFC5F9730C91}" type="datetimeFigureOut">
               <a:rPr lang="nb-NO" smtClean="0"/>
-              <a:t>31.10.2023</a:t>
+              <a:t>03.11.2023</a:t>
             </a:fld>
             <a:endParaRPr lang="nb-NO"/>
           </a:p>
@@ -2983,13 +2988,13 @@
           <p:nvPr>
             <p:extLst>
               <p:ext uri="{D42A27DB-BD31-4B8C-83A1-F6EECF244321}">
-                <p14:modId xmlns:p14="http://schemas.microsoft.com/office/powerpoint/2010/main" val="3037262512"/>
+                <p14:modId xmlns:p14="http://schemas.microsoft.com/office/powerpoint/2010/main" val="2834089303"/>
               </p:ext>
             </p:extLst>
           </p:nvPr>
         </p:nvGraphicFramePr>
         <p:xfrm>
-          <a:off x="856350" y="976638"/>
+          <a:off x="1582603" y="903880"/>
           <a:ext cx="3512450" cy="1963357"/>
         </p:xfrm>
         <a:graphic>
@@ -3007,7 +3012,7 @@
                   </a:extLst>
                 </a:gridCol>
               </a:tblGrid>
-              <a:tr h="370840">
+              <a:tr h="355257">
                 <a:tc>
                   <a:txBody>
                     <a:bodyPr/>
@@ -3613,9 +3618,9 @@
           <p:nvPr/>
         </p:nvCxnSpPr>
         <p:spPr>
-          <a:xfrm rot="16200000" flipH="1">
-            <a:off x="2354734" y="3197836"/>
-            <a:ext cx="1125283" cy="609600"/>
+          <a:xfrm rot="5400000">
+            <a:off x="2681482" y="3407931"/>
+            <a:ext cx="1198041" cy="116653"/>
           </a:xfrm>
           <a:prstGeom prst="bentConnector3">
             <a:avLst>

</xml_diff>